<commit_message>
figures-png and ltspice files
</commit_message>
<xml_diff>
--- a/WPT/3-coil/Three-Coil-Journal/matlab/Current_Balancing/New Microsoft PowerPoint Presentation.pptx
+++ b/WPT/3-coil/Three-Coil-Journal/matlab/Current_Balancing/New Microsoft PowerPoint Presentation.pptx
@@ -3536,7 +3536,7 @@
         </p:blipFill>
         <p:spPr>
           <a:xfrm>
-            <a:off x="7788675" y="1216056"/>
+            <a:off x="7620004" y="1216056"/>
             <a:ext cx="781234" cy="1162976"/>
           </a:xfrm>
           <a:prstGeom prst="rect">
@@ -3625,7 +3625,7 @@
         </p:nvSpPr>
         <p:spPr>
           <a:xfrm>
-            <a:off x="6441673" y="2969951"/>
+            <a:off x="6227689" y="2951778"/>
             <a:ext cx="807868" cy="338554"/>
           </a:xfrm>
           <a:prstGeom prst="rect">
@@ -3694,13 +3694,13 @@
         </p:nvPicPr>
         <p:blipFill rotWithShape="1">
           <a:blip r:embed="rId5"/>
-          <a:srcRect l="7560" b="22156"/>
+          <a:srcRect l="18601" b="22156"/>
           <a:stretch/>
         </p:blipFill>
         <p:spPr>
           <a:xfrm>
-            <a:off x="5321793" y="1064951"/>
-            <a:ext cx="2641478" cy="1482940"/>
+            <a:off x="5468648" y="1064951"/>
+            <a:ext cx="2325951" cy="1482940"/>
           </a:xfrm>
           <a:prstGeom prst="rect">
             <a:avLst/>
@@ -3728,7 +3728,7 @@
         </p:blipFill>
         <p:spPr>
           <a:xfrm>
-            <a:off x="5105772" y="2530136"/>
+            <a:off x="4950413" y="2530136"/>
             <a:ext cx="2857499" cy="439815"/>
           </a:xfrm>
           <a:prstGeom prst="rect">

</xml_diff>